<commit_message>
added aks nodepool option
</commit_message>
<xml_diff>
--- a/AKS-baseline.pptx
+++ b/AKS-baseline.pptx
@@ -5033,7 +5033,7 @@
         </p:blipFill>
         <p:spPr>
           <a:xfrm>
-            <a:off x="5571970" y="1943817"/>
+            <a:off x="5579725" y="2115387"/>
             <a:ext cx="530713" cy="530713"/>
           </a:xfrm>
           <a:prstGeom prst="rect">
@@ -5055,7 +5055,7 @@
         </p:nvSpPr>
         <p:spPr>
           <a:xfrm>
-            <a:off x="5571970" y="2485484"/>
+            <a:off x="5579725" y="2657054"/>
             <a:ext cx="570990" cy="246221"/>
           </a:xfrm>
           <a:prstGeom prst="rect">
@@ -5266,7 +5266,7 @@
               <a:t>”</a:t>
             </a:r>
             <a:r>
-              <a:rPr lang="sv-SE" sz="1000" dirty="0" err="1"/>
+              <a:rPr lang="sv-SE" sz="1000" b="1" dirty="0" err="1"/>
               <a:t>npsystem</a:t>
             </a:r>
             <a:r>
@@ -5398,7 +5398,15 @@
           <a:p>
             <a:r>
               <a:rPr lang="sv-SE" sz="1000" dirty="0"/>
-              <a:t>”npuser01” </a:t>
+              <a:t>”</a:t>
+            </a:r>
+            <a:r>
+              <a:rPr lang="sv-SE" sz="1000" b="1" dirty="0"/>
+              <a:t>npuser01</a:t>
+            </a:r>
+            <a:r>
+              <a:rPr lang="sv-SE" sz="1000" dirty="0"/>
+              <a:t>” </a:t>
             </a:r>
             <a:endParaRPr lang="en-SE" sz="1000" dirty="0"/>
           </a:p>
@@ -6479,6 +6487,341 @@
           </a:p>
         </p:txBody>
       </p:sp>
+      <p:cxnSp>
+        <p:nvCxnSpPr>
+          <p:cNvPr id="1025" name="Straight Arrow Connector 1024">
+            <a:extLst>
+              <a:ext uri="{FF2B5EF4-FFF2-40B4-BE49-F238E27FC236}">
+                <a16:creationId xmlns:a16="http://schemas.microsoft.com/office/drawing/2014/main" id="{E18470F1-1A69-445D-8E64-2CEF37935008}"/>
+              </a:ext>
+            </a:extLst>
+          </p:cNvPr>
+          <p:cNvCxnSpPr>
+            <a:stCxn id="14" idx="3"/>
+            <a:endCxn id="53" idx="1"/>
+          </p:cNvCxnSpPr>
+          <p:nvPr/>
+        </p:nvCxnSpPr>
+        <p:spPr>
+          <a:xfrm>
+            <a:off x="3513188" y="2379777"/>
+            <a:ext cx="2066537" cy="967"/>
+          </a:xfrm>
+          <a:prstGeom prst="straightConnector1">
+            <a:avLst/>
+          </a:prstGeom>
+          <a:ln>
+            <a:tailEnd type="triangle"/>
+          </a:ln>
+        </p:spPr>
+        <p:style>
+          <a:lnRef idx="1">
+            <a:schemeClr val="accent1"/>
+          </a:lnRef>
+          <a:fillRef idx="0">
+            <a:schemeClr val="accent1"/>
+          </a:fillRef>
+          <a:effectRef idx="0">
+            <a:schemeClr val="accent1"/>
+          </a:effectRef>
+          <a:fontRef idx="minor">
+            <a:schemeClr val="tx1"/>
+          </a:fontRef>
+        </p:style>
+      </p:cxnSp>
+      <p:cxnSp>
+        <p:nvCxnSpPr>
+          <p:cNvPr id="1029" name="Connector: Elbow 1028">
+            <a:extLst>
+              <a:ext uri="{FF2B5EF4-FFF2-40B4-BE49-F238E27FC236}">
+                <a16:creationId xmlns:a16="http://schemas.microsoft.com/office/drawing/2014/main" id="{D0595E14-0F2C-4056-A01D-389564D0141C}"/>
+              </a:ext>
+            </a:extLst>
+          </p:cNvPr>
+          <p:cNvCxnSpPr>
+            <a:cxnSpLocks/>
+            <a:stCxn id="53" idx="3"/>
+            <a:endCxn id="56" idx="3"/>
+          </p:cNvCxnSpPr>
+          <p:nvPr/>
+        </p:nvCxnSpPr>
+        <p:spPr>
+          <a:xfrm>
+            <a:off x="6110438" y="2380744"/>
+            <a:ext cx="1784328" cy="248115"/>
+          </a:xfrm>
+          <a:prstGeom prst="bentConnector5">
+            <a:avLst>
+              <a:gd name="adj1" fmla="val 28337"/>
+              <a:gd name="adj2" fmla="val 2475"/>
+              <a:gd name="adj3" fmla="val 54245"/>
+            </a:avLst>
+          </a:prstGeom>
+          <a:ln>
+            <a:tailEnd type="triangle"/>
+          </a:ln>
+        </p:spPr>
+        <p:style>
+          <a:lnRef idx="1">
+            <a:schemeClr val="accent1"/>
+          </a:lnRef>
+          <a:fillRef idx="0">
+            <a:schemeClr val="accent1"/>
+          </a:fillRef>
+          <a:effectRef idx="0">
+            <a:schemeClr val="accent1"/>
+          </a:effectRef>
+          <a:fontRef idx="minor">
+            <a:schemeClr val="tx1"/>
+          </a:fontRef>
+        </p:style>
+      </p:cxnSp>
+      <p:cxnSp>
+        <p:nvCxnSpPr>
+          <p:cNvPr id="1036" name="Connector: Elbow 1035">
+            <a:extLst>
+              <a:ext uri="{FF2B5EF4-FFF2-40B4-BE49-F238E27FC236}">
+                <a16:creationId xmlns:a16="http://schemas.microsoft.com/office/drawing/2014/main" id="{EDCA9AF3-FBF3-4CFE-B679-06F64D85A098}"/>
+              </a:ext>
+            </a:extLst>
+          </p:cNvPr>
+          <p:cNvCxnSpPr>
+            <a:cxnSpLocks/>
+            <a:stCxn id="53" idx="3"/>
+            <a:endCxn id="59" idx="1"/>
+          </p:cNvCxnSpPr>
+          <p:nvPr/>
+        </p:nvCxnSpPr>
+        <p:spPr>
+          <a:xfrm flipV="1">
+            <a:off x="6110438" y="1382101"/>
+            <a:ext cx="1932263" cy="998643"/>
+          </a:xfrm>
+          <a:prstGeom prst="bentConnector3">
+            <a:avLst>
+              <a:gd name="adj1" fmla="val 50724"/>
+            </a:avLst>
+          </a:prstGeom>
+          <a:ln>
+            <a:tailEnd type="triangle"/>
+          </a:ln>
+        </p:spPr>
+        <p:style>
+          <a:lnRef idx="1">
+            <a:schemeClr val="accent1"/>
+          </a:lnRef>
+          <a:fillRef idx="0">
+            <a:schemeClr val="accent1"/>
+          </a:fillRef>
+          <a:effectRef idx="0">
+            <a:schemeClr val="accent1"/>
+          </a:effectRef>
+          <a:fontRef idx="minor">
+            <a:schemeClr val="tx1"/>
+          </a:fontRef>
+        </p:style>
+      </p:cxnSp>
+      <p:cxnSp>
+        <p:nvCxnSpPr>
+          <p:cNvPr id="1042" name="Straight Connector 1041">
+            <a:extLst>
+              <a:ext uri="{FF2B5EF4-FFF2-40B4-BE49-F238E27FC236}">
+                <a16:creationId xmlns:a16="http://schemas.microsoft.com/office/drawing/2014/main" id="{00645712-7DE2-4F32-97FB-958D37BAC355}"/>
+              </a:ext>
+            </a:extLst>
+          </p:cNvPr>
+          <p:cNvCxnSpPr>
+            <a:cxnSpLocks/>
+            <a:endCxn id="1026" idx="0"/>
+          </p:cNvCxnSpPr>
+          <p:nvPr/>
+        </p:nvCxnSpPr>
+        <p:spPr>
+          <a:xfrm flipH="1">
+            <a:off x="8376301" y="4082444"/>
+            <a:ext cx="10049" cy="1657036"/>
+          </a:xfrm>
+          <a:prstGeom prst="line">
+            <a:avLst/>
+          </a:prstGeom>
+          <a:ln>
+            <a:tailEnd type="triangle"/>
+          </a:ln>
+        </p:spPr>
+        <p:style>
+          <a:lnRef idx="1">
+            <a:schemeClr val="accent1"/>
+          </a:lnRef>
+          <a:fillRef idx="0">
+            <a:schemeClr val="accent1"/>
+          </a:fillRef>
+          <a:effectRef idx="0">
+            <a:schemeClr val="accent1"/>
+          </a:effectRef>
+          <a:fontRef idx="minor">
+            <a:schemeClr val="tx1"/>
+          </a:fontRef>
+        </p:style>
+      </p:cxnSp>
+      <p:cxnSp>
+        <p:nvCxnSpPr>
+          <p:cNvPr id="1046" name="Straight Connector 1045">
+            <a:extLst>
+              <a:ext uri="{FF2B5EF4-FFF2-40B4-BE49-F238E27FC236}">
+                <a16:creationId xmlns:a16="http://schemas.microsoft.com/office/drawing/2014/main" id="{8616FADE-E1E4-4E05-9426-80B815F4ED71}"/>
+              </a:ext>
+            </a:extLst>
+          </p:cNvPr>
+          <p:cNvCxnSpPr>
+            <a:cxnSpLocks/>
+            <a:endCxn id="35" idx="1"/>
+          </p:cNvCxnSpPr>
+          <p:nvPr/>
+        </p:nvCxnSpPr>
+        <p:spPr>
+          <a:xfrm>
+            <a:off x="237931" y="2334425"/>
+            <a:ext cx="1557170" cy="8028"/>
+          </a:xfrm>
+          <a:prstGeom prst="line">
+            <a:avLst/>
+          </a:prstGeom>
+          <a:ln>
+            <a:tailEnd type="triangle"/>
+          </a:ln>
+        </p:spPr>
+        <p:style>
+          <a:lnRef idx="1">
+            <a:schemeClr val="accent1"/>
+          </a:lnRef>
+          <a:fillRef idx="0">
+            <a:schemeClr val="accent1"/>
+          </a:fillRef>
+          <a:effectRef idx="0">
+            <a:schemeClr val="accent1"/>
+          </a:effectRef>
+          <a:fontRef idx="minor">
+            <a:schemeClr val="tx1"/>
+          </a:fontRef>
+        </p:style>
+      </p:cxnSp>
+      <p:sp>
+        <p:nvSpPr>
+          <p:cNvPr id="1047" name="TextBox 1046">
+            <a:extLst>
+              <a:ext uri="{FF2B5EF4-FFF2-40B4-BE49-F238E27FC236}">
+                <a16:creationId xmlns:a16="http://schemas.microsoft.com/office/drawing/2014/main" id="{EEE11012-1FC4-4177-9352-8B64D31AEF82}"/>
+              </a:ext>
+            </a:extLst>
+          </p:cNvPr>
+          <p:cNvSpPr txBox="1"/>
+          <p:nvPr/>
+        </p:nvSpPr>
+        <p:spPr>
+          <a:xfrm>
+            <a:off x="549476" y="2096232"/>
+            <a:ext cx="971741" cy="246221"/>
+          </a:xfrm>
+          <a:prstGeom prst="rect">
+            <a:avLst/>
+          </a:prstGeom>
+          <a:noFill/>
+        </p:spPr>
+        <p:txBody>
+          <a:bodyPr wrap="none" rtlCol="0">
+            <a:spAutoFit/>
+          </a:bodyPr>
+          <a:lstStyle/>
+          <a:p>
+            <a:r>
+              <a:rPr lang="sv-SE" sz="1000" dirty="0"/>
+              <a:t>SSL – tobii.com</a:t>
+            </a:r>
+            <a:endParaRPr lang="en-SE" sz="1000" dirty="0"/>
+          </a:p>
+        </p:txBody>
+      </p:sp>
+      <p:sp>
+        <p:nvSpPr>
+          <p:cNvPr id="1048" name="TextBox 1047">
+            <a:extLst>
+              <a:ext uri="{FF2B5EF4-FFF2-40B4-BE49-F238E27FC236}">
+                <a16:creationId xmlns:a16="http://schemas.microsoft.com/office/drawing/2014/main" id="{5A59EBEA-5AB8-412D-AF60-411AAB9A8095}"/>
+              </a:ext>
+            </a:extLst>
+          </p:cNvPr>
+          <p:cNvSpPr txBox="1"/>
+          <p:nvPr/>
+        </p:nvSpPr>
+        <p:spPr>
+          <a:xfrm>
+            <a:off x="3664536" y="2154895"/>
+            <a:ext cx="1425390" cy="246221"/>
+          </a:xfrm>
+          <a:prstGeom prst="rect">
+            <a:avLst/>
+          </a:prstGeom>
+          <a:noFill/>
+        </p:spPr>
+        <p:txBody>
+          <a:bodyPr wrap="none" rtlCol="0">
+            <a:spAutoFit/>
+          </a:bodyPr>
+          <a:lstStyle/>
+          <a:p>
+            <a:r>
+              <a:rPr lang="sv-SE" sz="1000" dirty="0"/>
+              <a:t>SSL – </a:t>
+            </a:r>
+            <a:r>
+              <a:rPr lang="sv-SE" sz="1000" dirty="0" err="1"/>
+              <a:t>internal.tobii.local</a:t>
+            </a:r>
+            <a:endParaRPr lang="en-SE" sz="1000" dirty="0"/>
+          </a:p>
+        </p:txBody>
+      </p:sp>
+      <p:cxnSp>
+        <p:nvCxnSpPr>
+          <p:cNvPr id="1050" name="Straight Arrow Connector 1049">
+            <a:extLst>
+              <a:ext uri="{FF2B5EF4-FFF2-40B4-BE49-F238E27FC236}">
+                <a16:creationId xmlns:a16="http://schemas.microsoft.com/office/drawing/2014/main" id="{4554C7D8-0445-45F6-A0D3-9A3784DB003A}"/>
+              </a:ext>
+            </a:extLst>
+          </p:cNvPr>
+          <p:cNvCxnSpPr>
+            <a:stCxn id="126" idx="1"/>
+          </p:cNvCxnSpPr>
+          <p:nvPr/>
+        </p:nvCxnSpPr>
+        <p:spPr>
+          <a:xfrm flipH="1">
+            <a:off x="881743" y="4318985"/>
+            <a:ext cx="686781" cy="0"/>
+          </a:xfrm>
+          <a:prstGeom prst="straightConnector1">
+            <a:avLst/>
+          </a:prstGeom>
+          <a:ln>
+            <a:tailEnd type="triangle"/>
+          </a:ln>
+        </p:spPr>
+        <p:style>
+          <a:lnRef idx="1">
+            <a:schemeClr val="accent1"/>
+          </a:lnRef>
+          <a:fillRef idx="0">
+            <a:schemeClr val="accent1"/>
+          </a:fillRef>
+          <a:effectRef idx="0">
+            <a:schemeClr val="accent1"/>
+          </a:effectRef>
+          <a:fontRef idx="minor">
+            <a:schemeClr val="tx1"/>
+          </a:fontRef>
+        </p:style>
+      </p:cxnSp>
     </p:spTree>
     <p:extLst>
       <p:ext uri="{BB962C8B-B14F-4D97-AF65-F5344CB8AC3E}">
@@ -6524,7 +6867,7 @@
         <p:spPr>
           <a:xfrm>
             <a:off x="2470260" y="233740"/>
-            <a:ext cx="7838038" cy="4540204"/>
+            <a:ext cx="8404300" cy="4540204"/>
           </a:xfrm>
           <a:prstGeom prst="rect">
             <a:avLst/>
@@ -8979,7 +9322,7 @@
         </p:blipFill>
         <p:spPr bwMode="auto">
           <a:xfrm>
-            <a:off x="10754089" y="2244651"/>
+            <a:off x="10939163" y="2218849"/>
             <a:ext cx="1135817" cy="707886"/>
           </a:xfrm>
           <a:prstGeom prst="rect">
@@ -9019,7 +9362,7 @@
         </p:blipFill>
         <p:spPr>
           <a:xfrm>
-            <a:off x="11142282" y="3102428"/>
+            <a:off x="11388200" y="3087398"/>
             <a:ext cx="359433" cy="489663"/>
           </a:xfrm>
           <a:prstGeom prst="rect">
@@ -9041,7 +9384,7 @@
         </p:nvSpPr>
         <p:spPr>
           <a:xfrm>
-            <a:off x="11047802" y="3510531"/>
+            <a:off x="11293720" y="3495501"/>
             <a:ext cx="944373" cy="861774"/>
           </a:xfrm>
           <a:prstGeom prst="rect">
@@ -9085,6 +9428,131 @@
           </a:p>
         </p:txBody>
       </p:sp>
+      <p:pic>
+        <p:nvPicPr>
+          <p:cNvPr id="24" name="Picture 23" descr="Icon&#10;&#10;Description automatically generated">
+            <a:extLst>
+              <a:ext uri="{FF2B5EF4-FFF2-40B4-BE49-F238E27FC236}">
+                <a16:creationId xmlns:a16="http://schemas.microsoft.com/office/drawing/2014/main" id="{AFEC2577-9C14-4A07-AADC-A79A49140518}"/>
+              </a:ext>
+            </a:extLst>
+          </p:cNvPr>
+          <p:cNvPicPr>
+            <a:picLocks noChangeAspect="1"/>
+          </p:cNvPicPr>
+          <p:nvPr/>
+        </p:nvPicPr>
+        <p:blipFill>
+          <a:blip r:embed="rId14">
+            <a:extLst>
+              <a:ext uri="{28A0092B-C50C-407E-A947-70E740481C1C}">
+                <a14:useLocalDpi xmlns:a14="http://schemas.microsoft.com/office/drawing/2010/main" val="0"/>
+              </a:ext>
+            </a:extLst>
+          </a:blip>
+          <a:stretch>
+            <a:fillRect/>
+          </a:stretch>
+        </p:blipFill>
+        <p:spPr>
+          <a:xfrm>
+            <a:off x="10069144" y="2500357"/>
+            <a:ext cx="528138" cy="528138"/>
+          </a:xfrm>
+          <a:prstGeom prst="rect">
+            <a:avLst/>
+          </a:prstGeom>
+        </p:spPr>
+      </p:pic>
+      <p:sp>
+        <p:nvSpPr>
+          <p:cNvPr id="25" name="TextBox 24">
+            <a:extLst>
+              <a:ext uri="{FF2B5EF4-FFF2-40B4-BE49-F238E27FC236}">
+                <a16:creationId xmlns:a16="http://schemas.microsoft.com/office/drawing/2014/main" id="{53F854CF-FB7B-474A-AF55-7FA6143891F6}"/>
+              </a:ext>
+            </a:extLst>
+          </p:cNvPr>
+          <p:cNvSpPr txBox="1"/>
+          <p:nvPr/>
+        </p:nvSpPr>
+        <p:spPr>
+          <a:xfrm>
+            <a:off x="9978536" y="3037842"/>
+            <a:ext cx="875684" cy="553998"/>
+          </a:xfrm>
+          <a:prstGeom prst="rect">
+            <a:avLst/>
+          </a:prstGeom>
+          <a:noFill/>
+        </p:spPr>
+        <p:txBody>
+          <a:bodyPr wrap="square" rtlCol="0">
+            <a:spAutoFit/>
+          </a:bodyPr>
+          <a:lstStyle/>
+          <a:p>
+            <a:r>
+              <a:rPr lang="sv-SE" sz="1000" dirty="0"/>
+              <a:t>DevOps</a:t>
+            </a:r>
+          </a:p>
+          <a:p>
+            <a:r>
+              <a:rPr lang="sv-SE" sz="1000" dirty="0" err="1"/>
+              <a:t>Build</a:t>
+            </a:r>
+            <a:r>
+              <a:rPr lang="sv-SE" sz="1000" dirty="0"/>
+              <a:t> VM/agents</a:t>
+            </a:r>
+            <a:endParaRPr lang="en-SE" sz="1000" dirty="0"/>
+          </a:p>
+        </p:txBody>
+      </p:sp>
+      <p:cxnSp>
+        <p:nvCxnSpPr>
+          <p:cNvPr id="30" name="Connector: Elbow 29">
+            <a:extLst>
+              <a:ext uri="{FF2B5EF4-FFF2-40B4-BE49-F238E27FC236}">
+                <a16:creationId xmlns:a16="http://schemas.microsoft.com/office/drawing/2014/main" id="{213F60D7-C034-4036-9270-ACE508E57F39}"/>
+              </a:ext>
+            </a:extLst>
+          </p:cNvPr>
+          <p:cNvCxnSpPr>
+            <a:stCxn id="24" idx="3"/>
+          </p:cNvCxnSpPr>
+          <p:nvPr/>
+        </p:nvCxnSpPr>
+        <p:spPr>
+          <a:xfrm flipV="1">
+            <a:off x="10597282" y="2551915"/>
+            <a:ext cx="623956" cy="212511"/>
+          </a:xfrm>
+          <a:prstGeom prst="bentConnector3">
+            <a:avLst>
+              <a:gd name="adj1" fmla="val 64206"/>
+            </a:avLst>
+          </a:prstGeom>
+          <a:ln>
+            <a:tailEnd type="triangle"/>
+          </a:ln>
+        </p:spPr>
+        <p:style>
+          <a:lnRef idx="1">
+            <a:schemeClr val="accent1"/>
+          </a:lnRef>
+          <a:fillRef idx="0">
+            <a:schemeClr val="accent1"/>
+          </a:fillRef>
+          <a:effectRef idx="0">
+            <a:schemeClr val="accent1"/>
+          </a:effectRef>
+          <a:fontRef idx="minor">
+            <a:schemeClr val="tx1"/>
+          </a:fontRef>
+        </p:style>
+      </p:cxnSp>
     </p:spTree>
     <p:extLst>
       <p:ext uri="{BB962C8B-B14F-4D97-AF65-F5344CB8AC3E}">

</xml_diff>